<commit_message>
PPT Update - close to final draft
</commit_message>
<xml_diff>
--- a/JPeNS_Presentation.pptx
+++ b/JPeNS_Presentation.pptx
@@ -11,7 +11,6 @@
     <p:sldId id="259" r:id="rId5"/>
     <p:sldId id="262" r:id="rId6"/>
     <p:sldId id="261" r:id="rId7"/>
-    <p:sldId id="260" r:id="rId8"/>
   </p:sldIdLst>
   <p:sldSz cx="9144000" cy="6858000" type="screen4x3"/>
   <p:notesSz cx="6858000" cy="9144000"/>
@@ -3191,47 +3190,18 @@
                   <a:schemeClr val="bg1"/>
                 </a:solidFill>
               </a:rPr>
-              <a:t>Team </a:t>
-            </a:r>
-            <a:r>
-              <a:rPr lang="en-US" sz="2400" dirty="0" smtClean="0">
+              <a:t>Team 5</a:t>
+            </a:r>
+          </a:p>
+          <a:p>
+            <a:pPr algn="ctr"/>
+            <a:r>
+              <a:rPr lang="en-US" sz="1600" dirty="0" smtClean="0">
                 <a:solidFill>
                   <a:schemeClr val="bg1"/>
                 </a:solidFill>
               </a:rPr>
-              <a:t>5</a:t>
-            </a:r>
-            <a:endParaRPr lang="en-US" sz="2400" dirty="0" smtClean="0">
-              <a:solidFill>
-                <a:schemeClr val="bg1"/>
-              </a:solidFill>
-            </a:endParaRPr>
-          </a:p>
-          <a:p>
-            <a:pPr algn="ctr"/>
-            <a:r>
-              <a:rPr lang="en-US" sz="1600" dirty="0" smtClean="0">
-                <a:solidFill>
-                  <a:schemeClr val="bg1"/>
-                </a:solidFill>
-              </a:rPr>
-              <a:t>Jonathan </a:t>
-            </a:r>
-            <a:r>
-              <a:rPr lang="en-US" sz="1600" dirty="0" smtClean="0">
-                <a:solidFill>
-                  <a:schemeClr val="bg1"/>
-                </a:solidFill>
-              </a:rPr>
-              <a:t>Babbitt &amp; Chris </a:t>
-            </a:r>
-            <a:r>
-              <a:rPr lang="en-US" sz="1600" dirty="0" smtClean="0">
-                <a:solidFill>
-                  <a:schemeClr val="bg1"/>
-                </a:solidFill>
-              </a:rPr>
-              <a:t>Hobbs</a:t>
+              <a:t>Jonathan Babbitt &amp; Chris Hobbs</a:t>
             </a:r>
             <a:endParaRPr lang="en-US" sz="1600" dirty="0">
               <a:solidFill>
@@ -3358,17 +3328,7 @@
                 <a:latin typeface="Calibri" pitchFamily="34" charset="0"/>
                 <a:cs typeface="Calibri" pitchFamily="34" charset="0"/>
               </a:rPr>
-              <a:t>Aid </a:t>
-            </a:r>
-            <a:r>
-              <a:rPr lang="en-US" dirty="0" smtClean="0">
-                <a:solidFill>
-                  <a:schemeClr val="bg1"/>
-                </a:solidFill>
-                <a:latin typeface="Calibri" pitchFamily="34" charset="0"/>
-                <a:cs typeface="Calibri" pitchFamily="34" charset="0"/>
-              </a:rPr>
-              <a:t>in comprehension of Petri Networks</a:t>
+              <a:t>Aid in comprehension of Petri Networks</a:t>
             </a:r>
           </a:p>
           <a:p>
@@ -3382,13 +3342,6 @@
               </a:rPr>
               <a:t>Visual representation of networks</a:t>
             </a:r>
-            <a:endParaRPr lang="en-US" dirty="0" smtClean="0">
-              <a:solidFill>
-                <a:schemeClr val="bg1"/>
-              </a:solidFill>
-              <a:latin typeface="Calibri" pitchFamily="34" charset="0"/>
-              <a:cs typeface="Calibri" pitchFamily="34" charset="0"/>
-            </a:endParaRPr>
           </a:p>
           <a:p>
             <a:r>
@@ -3401,13 +3354,6 @@
               </a:rPr>
               <a:t>XML based file I/O</a:t>
             </a:r>
-            <a:endParaRPr lang="en-US" dirty="0" smtClean="0">
-              <a:solidFill>
-                <a:schemeClr val="bg1"/>
-              </a:solidFill>
-              <a:latin typeface="Calibri" pitchFamily="34" charset="0"/>
-              <a:cs typeface="Calibri" pitchFamily="34" charset="0"/>
-            </a:endParaRPr>
           </a:p>
           <a:p>
             <a:r>
@@ -3418,17 +3364,7 @@
                 <a:latin typeface="Calibri" pitchFamily="34" charset="0"/>
                 <a:cs typeface="Calibri" pitchFamily="34" charset="0"/>
               </a:rPr>
-              <a:t>Color coded </a:t>
-            </a:r>
-            <a:r>
-              <a:rPr lang="en-US" dirty="0" smtClean="0">
-                <a:solidFill>
-                  <a:schemeClr val="bg1"/>
-                </a:solidFill>
-                <a:latin typeface="Calibri" pitchFamily="34" charset="0"/>
-                <a:cs typeface="Calibri" pitchFamily="34" charset="0"/>
-              </a:rPr>
-              <a:t>interface</a:t>
+              <a:t>Color coded interface</a:t>
             </a:r>
             <a:endParaRPr lang="en-US" dirty="0">
               <a:solidFill>
@@ -3524,8 +3460,8 @@
         </p:nvSpPr>
         <p:spPr>
           <a:xfrm>
-            <a:off x="914400" y="1676400"/>
-            <a:ext cx="7772400" cy="4572000"/>
+            <a:off x="457200" y="1600200"/>
+            <a:ext cx="8229600" cy="4648200"/>
           </a:xfrm>
         </p:spPr>
         <p:txBody>
@@ -3542,8 +3478,10 @@
                 <a:latin typeface="Calibri" pitchFamily="34" charset="0"/>
                 <a:cs typeface="Calibri" pitchFamily="34" charset="0"/>
               </a:rPr>
-              <a:t>Interesting </a:t>
-            </a:r>
+              <a:t>Interesting topic</a:t>
+            </a:r>
+          </a:p>
+          <a:p>
             <a:r>
               <a:rPr lang="en-US" dirty="0" smtClean="0">
                 <a:solidFill>
@@ -3552,7 +3490,7 @@
                 <a:latin typeface="Calibri" pitchFamily="34" charset="0"/>
                 <a:cs typeface="Calibri" pitchFamily="34" charset="0"/>
               </a:rPr>
-              <a:t>topic</a:t>
+              <a:t>Difficult topic to learn </a:t>
             </a:r>
           </a:p>
           <a:p>
@@ -3564,8 +3502,10 @@
                 <a:latin typeface="Calibri" pitchFamily="34" charset="0"/>
                 <a:cs typeface="Calibri" pitchFamily="34" charset="0"/>
               </a:rPr>
-              <a:t>Difficult </a:t>
-            </a:r>
+              <a:t>Taught at various levels of the education</a:t>
+            </a:r>
+          </a:p>
+          <a:p>
             <a:r>
               <a:rPr lang="en-US" dirty="0" smtClean="0">
                 <a:solidFill>
@@ -3574,68 +3514,7 @@
                 <a:latin typeface="Calibri" pitchFamily="34" charset="0"/>
                 <a:cs typeface="Calibri" pitchFamily="34" charset="0"/>
               </a:rPr>
-              <a:t>topic to learn </a:t>
-            </a:r>
-            <a:endParaRPr lang="en-US" dirty="0" smtClean="0">
-              <a:solidFill>
-                <a:schemeClr val="bg1"/>
-              </a:solidFill>
-              <a:latin typeface="Calibri" pitchFamily="34" charset="0"/>
-              <a:cs typeface="Calibri" pitchFamily="34" charset="0"/>
-            </a:endParaRPr>
-          </a:p>
-          <a:p>
-            <a:r>
-              <a:rPr lang="en-US" dirty="0" smtClean="0">
-                <a:solidFill>
-                  <a:schemeClr val="bg1"/>
-                </a:solidFill>
-                <a:latin typeface="Calibri" pitchFamily="34" charset="0"/>
-                <a:cs typeface="Calibri" pitchFamily="34" charset="0"/>
-              </a:rPr>
-              <a:t>Taught </a:t>
-            </a:r>
-            <a:r>
-              <a:rPr lang="en-US" dirty="0" smtClean="0">
-                <a:solidFill>
-                  <a:schemeClr val="bg1"/>
-                </a:solidFill>
-                <a:latin typeface="Calibri" pitchFamily="34" charset="0"/>
-                <a:cs typeface="Calibri" pitchFamily="34" charset="0"/>
-              </a:rPr>
-              <a:t>at various levels of the </a:t>
-            </a:r>
-            <a:r>
-              <a:rPr lang="en-US" dirty="0" smtClean="0">
-                <a:solidFill>
-                  <a:schemeClr val="bg1"/>
-                </a:solidFill>
-                <a:latin typeface="Calibri" pitchFamily="34" charset="0"/>
-                <a:cs typeface="Calibri" pitchFamily="34" charset="0"/>
-              </a:rPr>
-              <a:t>education</a:t>
-            </a:r>
-          </a:p>
-          <a:p>
-            <a:r>
-              <a:rPr lang="en-US" dirty="0" smtClean="0">
-                <a:solidFill>
-                  <a:schemeClr val="bg1"/>
-                </a:solidFill>
-                <a:latin typeface="Calibri" pitchFamily="34" charset="0"/>
-                <a:cs typeface="Calibri" pitchFamily="34" charset="0"/>
-              </a:rPr>
-              <a:t>Useful </a:t>
-            </a:r>
-            <a:r>
-              <a:rPr lang="en-US" dirty="0" smtClean="0">
-                <a:solidFill>
-                  <a:schemeClr val="bg1"/>
-                </a:solidFill>
-                <a:latin typeface="Calibri" pitchFamily="34" charset="0"/>
-                <a:cs typeface="Calibri" pitchFamily="34" charset="0"/>
-              </a:rPr>
-              <a:t>for mapping a broad range of trigger </a:t>
+              <a:t>Useful for mapping a broad range of trigger </a:t>
             </a:r>
             <a:r>
               <a:rPr lang="en-US" dirty="0">
@@ -3889,6 +3768,24 @@
               </a:rPr>
               <a:t>Utilizes XML files </a:t>
             </a:r>
+          </a:p>
+          <a:p>
+            <a:r>
+              <a:rPr lang="en-US" dirty="0" smtClean="0">
+                <a:solidFill>
+                  <a:schemeClr val="bg1"/>
+                </a:solidFill>
+              </a:rPr>
+              <a:t>Generates lists for transitions, places, </a:t>
+            </a:r>
+            <a:r>
+              <a:rPr lang="en-US" dirty="0" err="1" smtClean="0">
+                <a:solidFill>
+                  <a:schemeClr val="bg1"/>
+                </a:solidFill>
+              </a:rPr>
+              <a:t>etc</a:t>
+            </a:r>
             <a:endParaRPr lang="en-US" dirty="0" smtClean="0">
               <a:solidFill>
                 <a:schemeClr val="bg1"/>
@@ -3902,7 +3799,7 @@
                   <a:schemeClr val="bg1"/>
                 </a:solidFill>
               </a:rPr>
-              <a:t>Generates lists for transitions, places, </a:t>
+              <a:t>Generates GUI objects and </a:t>
             </a:r>
             <a:r>
               <a:rPr lang="en-US" dirty="0" err="1" smtClean="0">
@@ -3910,7 +3807,7 @@
                   <a:schemeClr val="bg1"/>
                 </a:solidFill>
               </a:rPr>
-              <a:t>etc</a:t>
+              <a:t>mxGraph</a:t>
             </a:r>
             <a:endParaRPr lang="en-US" dirty="0" smtClean="0">
               <a:solidFill>
@@ -3925,21 +3822,18 @@
                   <a:schemeClr val="bg1"/>
                 </a:solidFill>
               </a:rPr>
-              <a:t>Generates GUI objects and </a:t>
-            </a:r>
-            <a:r>
-              <a:rPr lang="en-US" dirty="0" err="1" smtClean="0">
+              <a:t>Displays the main window</a:t>
+            </a:r>
+          </a:p>
+          <a:p>
+            <a:r>
+              <a:rPr lang="en-US" dirty="0" smtClean="0">
                 <a:solidFill>
                   <a:schemeClr val="bg1"/>
                 </a:solidFill>
               </a:rPr>
-              <a:t>mxGraph</a:t>
-            </a:r>
-            <a:endParaRPr lang="en-US" dirty="0" smtClean="0">
-              <a:solidFill>
-                <a:schemeClr val="bg1"/>
-              </a:solidFill>
-            </a:endParaRPr>
+              <a:t>Fire transitions in any order you like</a:t>
+            </a:r>
           </a:p>
           <a:p>
             <a:r>
@@ -3948,51 +3842,7 @@
                   <a:schemeClr val="bg1"/>
                 </a:solidFill>
               </a:rPr>
-              <a:t>Displays the main </a:t>
-            </a:r>
-            <a:r>
-              <a:rPr lang="en-US" dirty="0" smtClean="0">
-                <a:solidFill>
-                  <a:schemeClr val="bg1"/>
-                </a:solidFill>
-              </a:rPr>
-              <a:t>window</a:t>
-            </a:r>
-          </a:p>
-          <a:p>
-            <a:r>
-              <a:rPr lang="en-US" dirty="0" smtClean="0">
-                <a:solidFill>
-                  <a:schemeClr val="bg1"/>
-                </a:solidFill>
-              </a:rPr>
-              <a:t>Fire </a:t>
-            </a:r>
-            <a:r>
-              <a:rPr lang="en-US" dirty="0" smtClean="0">
-                <a:solidFill>
-                  <a:schemeClr val="bg1"/>
-                </a:solidFill>
-              </a:rPr>
-              <a:t>transitions in any order you like</a:t>
-            </a:r>
-          </a:p>
-          <a:p>
-            <a:r>
-              <a:rPr lang="en-US" dirty="0" smtClean="0">
-                <a:solidFill>
-                  <a:schemeClr val="bg1"/>
-                </a:solidFill>
-              </a:rPr>
-              <a:t>Updates </a:t>
-            </a:r>
-            <a:r>
-              <a:rPr lang="en-US" dirty="0" smtClean="0">
-                <a:solidFill>
-                  <a:schemeClr val="bg1"/>
-                </a:solidFill>
-              </a:rPr>
-              <a:t>the color coding each firing</a:t>
+              <a:t>Updates the color coding each firing</a:t>
             </a:r>
             <a:endParaRPr lang="en-US" dirty="0">
               <a:solidFill>
@@ -4058,32 +3908,15 @@
           </a:p>
         </p:txBody>
       </p:sp>
-      <p:sp>
-        <p:nvSpPr>
-          <p:cNvPr id="2" name="Content Placeholder 1"/>
-          <p:cNvSpPr>
-            <a:spLocks noGrp="1"/>
-          </p:cNvSpPr>
-          <p:nvPr>
-            <p:ph idx="1"/>
-          </p:nvPr>
-        </p:nvSpPr>
-        <p:spPr/>
-        <p:txBody>
-          <a:bodyPr/>
-          <a:lstStyle/>
-          <a:p>
-            <a:endParaRPr lang="en-US"/>
-          </a:p>
-        </p:txBody>
-      </p:sp>
       <p:pic>
         <p:nvPicPr>
-          <p:cNvPr id="1026" name="Picture 2"/>
+          <p:cNvPr id="4" name="Content Placeholder 3"/>
           <p:cNvPicPr>
-            <a:picLocks noChangeAspect="1" noChangeArrowheads="1"/>
+            <a:picLocks noGrp="1" noChangeAspect="1"/>
           </p:cNvPicPr>
-          <p:nvPr/>
+          <p:nvPr>
+            <p:ph idx="1"/>
+          </p:nvPr>
         </p:nvPicPr>
         <p:blipFill>
           <a:blip r:embed="rId2">
@@ -4093,52 +3926,15 @@
               </a:ext>
             </a:extLst>
           </a:blip>
-          <a:srcRect/>
           <a:stretch>
             <a:fillRect/>
           </a:stretch>
         </p:blipFill>
-        <p:spPr bwMode="auto">
+        <p:spPr>
           <a:xfrm>
-            <a:off x="-932" y="0"/>
-            <a:ext cx="9146599" cy="6858000"/>
+            <a:off x="1" y="0"/>
+            <a:ext cx="9144000" cy="6858000"/>
           </a:xfrm>
-          <a:prstGeom prst="rect">
-            <a:avLst/>
-          </a:prstGeom>
-          <a:noFill/>
-          <a:ln>
-            <a:noFill/>
-          </a:ln>
-          <a:effectLst/>
-          <a:extLst>
-            <a:ext uri="{909E8E84-426E-40DD-AFC4-6F175D3DCCD1}">
-              <a14:hiddenFill xmlns:a14="http://schemas.microsoft.com/office/drawing/2010/main">
-                <a:solidFill>
-                  <a:schemeClr val="accent1"/>
-                </a:solidFill>
-              </a14:hiddenFill>
-            </a:ext>
-            <a:ext uri="{91240B29-F687-4F45-9708-019B960494DF}">
-              <a14:hiddenLine xmlns:a14="http://schemas.microsoft.com/office/drawing/2010/main" w="9525">
-                <a:solidFill>
-                  <a:schemeClr val="tx1"/>
-                </a:solidFill>
-                <a:miter lim="800000"/>
-                <a:headEnd/>
-                <a:tailEnd/>
-              </a14:hiddenLine>
-            </a:ext>
-            <a:ext uri="{AF507438-7753-43E0-B8FC-AC1667EBCBE1}">
-              <a14:hiddenEffects xmlns:a14="http://schemas.microsoft.com/office/drawing/2010/main">
-                <a:effectLst>
-                  <a:outerShdw dist="35921" dir="2700000" algn="ctr" rotWithShape="0">
-                    <a:schemeClr val="bg2"/>
-                  </a:outerShdw>
-                </a:effectLst>
-              </a14:hiddenEffects>
-            </a:ext>
-          </a:extLst>
         </p:spPr>
       </p:pic>
     </p:spTree>
@@ -4219,7 +4015,12 @@
             <p:ph idx="1"/>
           </p:nvPr>
         </p:nvSpPr>
-        <p:spPr/>
+        <p:spPr>
+          <a:xfrm>
+            <a:off x="2743200" y="3124200"/>
+            <a:ext cx="3657600" cy="3001963"/>
+          </a:xfrm>
+        </p:spPr>
         <p:txBody>
           <a:bodyPr/>
           <a:lstStyle/>
@@ -4227,22 +4028,6 @@
             <a:pPr marL="0" indent="0">
               <a:buNone/>
             </a:pPr>
-            <a:r>
-              <a:rPr lang="en-US" dirty="0" err="1" smtClean="0">
-                <a:solidFill>
-                  <a:schemeClr val="bg1"/>
-                </a:solidFill>
-              </a:rPr>
-              <a:t>Postive</a:t>
-            </a:r>
-            <a:r>
-              <a:rPr lang="en-US" smtClean="0">
-                <a:solidFill>
-                  <a:schemeClr val="bg1"/>
-                </a:solidFill>
-              </a:rPr>
-              <a:t>?</a:t>
-            </a:r>
             <a:endParaRPr lang="en-US" dirty="0">
               <a:solidFill>
                 <a:schemeClr val="bg1"/>
@@ -4253,9 +4038,9 @@
       </p:sp>
       <p:pic>
         <p:nvPicPr>
-          <p:cNvPr id="2050" name="Picture 2"/>
+          <p:cNvPr id="4" name="Picture 3"/>
           <p:cNvPicPr>
-            <a:picLocks noChangeAspect="1" noChangeArrowheads="1"/>
+            <a:picLocks noChangeAspect="1"/>
           </p:cNvPicPr>
           <p:nvPr/>
         </p:nvPicPr>
@@ -4267,145 +4052,24 @@
               </a:ext>
             </a:extLst>
           </a:blip>
-          <a:srcRect/>
           <a:stretch>
             <a:fillRect/>
           </a:stretch>
         </p:blipFill>
-        <p:spPr bwMode="auto">
+        <p:spPr>
           <a:xfrm>
-            <a:off x="2667000" y="3352800"/>
-            <a:ext cx="3810000" cy="2857500"/>
+            <a:off x="1143000" y="1440872"/>
+            <a:ext cx="6858000" cy="5244353"/>
           </a:xfrm>
           <a:prstGeom prst="rect">
             <a:avLst/>
           </a:prstGeom>
-          <a:noFill/>
-          <a:ln>
-            <a:noFill/>
-          </a:ln>
-          <a:effectLst/>
-          <a:extLst>
-            <a:ext uri="{909E8E84-426E-40DD-AFC4-6F175D3DCCD1}">
-              <a14:hiddenFill xmlns:a14="http://schemas.microsoft.com/office/drawing/2010/main">
-                <a:solidFill>
-                  <a:schemeClr val="accent1"/>
-                </a:solidFill>
-              </a14:hiddenFill>
-            </a:ext>
-            <a:ext uri="{91240B29-F687-4F45-9708-019B960494DF}">
-              <a14:hiddenLine xmlns:a14="http://schemas.microsoft.com/office/drawing/2010/main" w="9525">
-                <a:solidFill>
-                  <a:schemeClr val="tx1"/>
-                </a:solidFill>
-                <a:miter lim="800000"/>
-                <a:headEnd/>
-                <a:tailEnd/>
-              </a14:hiddenLine>
-            </a:ext>
-            <a:ext uri="{AF507438-7753-43E0-B8FC-AC1667EBCBE1}">
-              <a14:hiddenEffects xmlns:a14="http://schemas.microsoft.com/office/drawing/2010/main">
-                <a:effectLst>
-                  <a:outerShdw dist="35921" dir="2700000" algn="ctr" rotWithShape="0">
-                    <a:schemeClr val="bg2"/>
-                  </a:outerShdw>
-                </a:effectLst>
-              </a14:hiddenEffects>
-            </a:ext>
-          </a:extLst>
         </p:spPr>
       </p:pic>
     </p:spTree>
     <p:extLst>
       <p:ext uri="{BB962C8B-B14F-4D97-AF65-F5344CB8AC3E}">
         <p14:creationId xmlns:p14="http://schemas.microsoft.com/office/powerpoint/2010/main" val="1981994058"/>
-      </p:ext>
-    </p:extLst>
-  </p:cSld>
-  <p:clrMapOvr>
-    <a:masterClrMapping/>
-  </p:clrMapOvr>
-  <p:timing>
-    <p:tnLst>
-      <p:par>
-        <p:cTn id="1" dur="indefinite" restart="never" nodeType="tmRoot"/>
-      </p:par>
-    </p:tnLst>
-  </p:timing>
-</p:sld>
-</file>
-
-<file path=ppt/slides/slide7.xml><?xml version="1.0" encoding="utf-8"?>
-<p:sld xmlns:a="http://schemas.openxmlformats.org/drawingml/2006/main" xmlns:r="http://schemas.openxmlformats.org/officeDocument/2006/relationships" xmlns:p="http://schemas.openxmlformats.org/presentationml/2006/main">
-  <p:cSld>
-    <p:spTree>
-      <p:nvGrpSpPr>
-        <p:cNvPr id="1" name=""/>
-        <p:cNvGrpSpPr/>
-        <p:nvPr/>
-      </p:nvGrpSpPr>
-      <p:grpSpPr>
-        <a:xfrm>
-          <a:off x="0" y="0"/>
-          <a:ext cx="0" cy="0"/>
-          <a:chOff x="0" y="0"/>
-          <a:chExt cx="0" cy="0"/>
-        </a:xfrm>
-      </p:grpSpPr>
-      <p:sp>
-        <p:nvSpPr>
-          <p:cNvPr id="3" name="Title 2"/>
-          <p:cNvSpPr>
-            <a:spLocks noGrp="1"/>
-          </p:cNvSpPr>
-          <p:nvPr>
-            <p:ph type="title"/>
-          </p:nvPr>
-        </p:nvSpPr>
-        <p:spPr/>
-        <p:txBody>
-          <a:bodyPr/>
-          <a:lstStyle/>
-          <a:p>
-            <a:r>
-              <a:rPr lang="en-US" dirty="0" smtClean="0">
-                <a:solidFill>
-                  <a:schemeClr val="bg1"/>
-                </a:solidFill>
-              </a:rPr>
-              <a:t>Conclusion</a:t>
-            </a:r>
-            <a:endParaRPr lang="en-US" dirty="0">
-              <a:solidFill>
-                <a:schemeClr val="bg1"/>
-              </a:solidFill>
-            </a:endParaRPr>
-          </a:p>
-        </p:txBody>
-      </p:sp>
-      <p:sp>
-        <p:nvSpPr>
-          <p:cNvPr id="2" name="Content Placeholder 1"/>
-          <p:cNvSpPr>
-            <a:spLocks noGrp="1"/>
-          </p:cNvSpPr>
-          <p:nvPr>
-            <p:ph idx="1"/>
-          </p:nvPr>
-        </p:nvSpPr>
-        <p:spPr/>
-        <p:txBody>
-          <a:bodyPr/>
-          <a:lstStyle/>
-          <a:p>
-            <a:endParaRPr lang="en-US" dirty="0"/>
-          </a:p>
-        </p:txBody>
-      </p:sp>
-    </p:spTree>
-    <p:extLst>
-      <p:ext uri="{BB962C8B-B14F-4D97-AF65-F5344CB8AC3E}">
-        <p14:creationId xmlns:p14="http://schemas.microsoft.com/office/powerpoint/2010/main" val="1884522462"/>
       </p:ext>
     </p:extLst>
   </p:cSld>

</xml_diff>

<commit_message>
Updated the powerpoint to have a simple example
</commit_message>
<xml_diff>
--- a/JPeNS_Presentation.pptx
+++ b/JPeNS_Presentation.pptx
@@ -6,11 +6,14 @@
   </p:sldMasterIdLst>
   <p:sldIdLst>
     <p:sldId id="256" r:id="rId2"/>
-    <p:sldId id="257" r:id="rId3"/>
-    <p:sldId id="258" r:id="rId4"/>
-    <p:sldId id="259" r:id="rId5"/>
-    <p:sldId id="262" r:id="rId6"/>
-    <p:sldId id="261" r:id="rId7"/>
+    <p:sldId id="263" r:id="rId3"/>
+    <p:sldId id="264" r:id="rId4"/>
+    <p:sldId id="257" r:id="rId5"/>
+    <p:sldId id="258" r:id="rId6"/>
+    <p:sldId id="259" r:id="rId7"/>
+    <p:sldId id="261" r:id="rId8"/>
+    <p:sldId id="265" r:id="rId9"/>
+    <p:sldId id="262" r:id="rId10"/>
   </p:sldIdLst>
   <p:sldSz cx="9144000" cy="6858000" type="screen4x3"/>
   <p:notesSz cx="6858000" cy="9144000"/>
@@ -293,7 +296,7 @@
           <a:p>
             <a:fld id="{DBE87E32-EAB1-466E-96FF-E88AF3478657}" type="datetimeFigureOut">
               <a:rPr lang="en-US" smtClean="0"/>
-              <a:t>4/11/2012</a:t>
+              <a:t>4/11/12</a:t>
             </a:fld>
             <a:endParaRPr lang="en-US" dirty="0"/>
           </a:p>
@@ -463,7 +466,7 @@
           <a:p>
             <a:fld id="{DBE87E32-EAB1-466E-96FF-E88AF3478657}" type="datetimeFigureOut">
               <a:rPr lang="en-US" smtClean="0"/>
-              <a:t>4/11/2012</a:t>
+              <a:t>4/11/12</a:t>
             </a:fld>
             <a:endParaRPr lang="en-US" dirty="0"/>
           </a:p>
@@ -643,7 +646,7 @@
           <a:p>
             <a:fld id="{DBE87E32-EAB1-466E-96FF-E88AF3478657}" type="datetimeFigureOut">
               <a:rPr lang="en-US" smtClean="0"/>
-              <a:t>4/11/2012</a:t>
+              <a:t>4/11/12</a:t>
             </a:fld>
             <a:endParaRPr lang="en-US" dirty="0"/>
           </a:p>
@@ -813,7 +816,7 @@
           <a:p>
             <a:fld id="{DBE87E32-EAB1-466E-96FF-E88AF3478657}" type="datetimeFigureOut">
               <a:rPr lang="en-US" smtClean="0"/>
-              <a:t>4/11/2012</a:t>
+              <a:t>4/11/12</a:t>
             </a:fld>
             <a:endParaRPr lang="en-US" dirty="0"/>
           </a:p>
@@ -1059,7 +1062,7 @@
           <a:p>
             <a:fld id="{DBE87E32-EAB1-466E-96FF-E88AF3478657}" type="datetimeFigureOut">
               <a:rPr lang="en-US" smtClean="0"/>
-              <a:t>4/11/2012</a:t>
+              <a:t>4/11/12</a:t>
             </a:fld>
             <a:endParaRPr lang="en-US" dirty="0"/>
           </a:p>
@@ -1347,7 +1350,7 @@
           <a:p>
             <a:fld id="{DBE87E32-EAB1-466E-96FF-E88AF3478657}" type="datetimeFigureOut">
               <a:rPr lang="en-US" smtClean="0"/>
-              <a:t>4/11/2012</a:t>
+              <a:t>4/11/12</a:t>
             </a:fld>
             <a:endParaRPr lang="en-US" dirty="0"/>
           </a:p>
@@ -1769,7 +1772,7 @@
           <a:p>
             <a:fld id="{DBE87E32-EAB1-466E-96FF-E88AF3478657}" type="datetimeFigureOut">
               <a:rPr lang="en-US" smtClean="0"/>
-              <a:t>4/11/2012</a:t>
+              <a:t>4/11/12</a:t>
             </a:fld>
             <a:endParaRPr lang="en-US" dirty="0"/>
           </a:p>
@@ -1887,7 +1890,7 @@
           <a:p>
             <a:fld id="{DBE87E32-EAB1-466E-96FF-E88AF3478657}" type="datetimeFigureOut">
               <a:rPr lang="en-US" smtClean="0"/>
-              <a:t>4/11/2012</a:t>
+              <a:t>4/11/12</a:t>
             </a:fld>
             <a:endParaRPr lang="en-US" dirty="0"/>
           </a:p>
@@ -1982,7 +1985,7 @@
           <a:p>
             <a:fld id="{DBE87E32-EAB1-466E-96FF-E88AF3478657}" type="datetimeFigureOut">
               <a:rPr lang="en-US" smtClean="0"/>
-              <a:t>4/11/2012</a:t>
+              <a:t>4/11/12</a:t>
             </a:fld>
             <a:endParaRPr lang="en-US" dirty="0"/>
           </a:p>
@@ -2259,7 +2262,7 @@
           <a:p>
             <a:fld id="{DBE87E32-EAB1-466E-96FF-E88AF3478657}" type="datetimeFigureOut">
               <a:rPr lang="en-US" smtClean="0"/>
-              <a:t>4/11/2012</a:t>
+              <a:t>4/11/12</a:t>
             </a:fld>
             <a:endParaRPr lang="en-US" dirty="0"/>
           </a:p>
@@ -2512,7 +2515,7 @@
           <a:p>
             <a:fld id="{DBE87E32-EAB1-466E-96FF-E88AF3478657}" type="datetimeFigureOut">
               <a:rPr lang="en-US" smtClean="0"/>
-              <a:t>4/11/2012</a:t>
+              <a:t>4/11/12</a:t>
             </a:fld>
             <a:endParaRPr lang="en-US" dirty="0"/>
           </a:p>
@@ -2728,7 +2731,7 @@
           <a:p>
             <a:fld id="{DBE87E32-EAB1-466E-96FF-E88AF3478657}" type="datetimeFigureOut">
               <a:rPr lang="en-US" smtClean="0"/>
-              <a:t>4/11/2012</a:t>
+              <a:t>4/11/12</a:t>
             </a:fld>
             <a:endParaRPr lang="en-US" dirty="0"/>
           </a:p>
@@ -3194,14 +3197,21 @@
             </a:r>
           </a:p>
           <a:p>
-            <a:pPr algn="ctr"/>
+            <a:r>
+              <a:rPr lang="en-US" sz="1600" dirty="0">
+                <a:solidFill>
+                  <a:schemeClr val="bg1"/>
+                </a:solidFill>
+              </a:rPr>
+              <a:t>Chris Hobbs </a:t>
+            </a:r>
             <a:r>
               <a:rPr lang="en-US" sz="1600" dirty="0" smtClean="0">
                 <a:solidFill>
                   <a:schemeClr val="bg1"/>
                 </a:solidFill>
               </a:rPr>
-              <a:t>Jonathan Babbitt &amp; Chris Hobbs</a:t>
+              <a:t>&amp; Jonathan Babbitt</a:t>
             </a:r>
             <a:endParaRPr lang="en-US" sz="1600" dirty="0">
               <a:solidFill>
@@ -3224,7 +3234,7 @@
   <p:timing>
     <p:tnLst>
       <p:par>
-        <p:cTn id="1" dur="indefinite" restart="never" nodeType="tmRoot"/>
+        <p:cTn xmlns:p14="http://schemas.microsoft.com/office/powerpoint/2010/main" id="1" dur="indefinite" restart="never" nodeType="tmRoot"/>
       </p:par>
     </p:tnLst>
   </p:timing>
@@ -3250,6 +3260,871 @@
       </p:grpSpPr>
       <p:sp>
         <p:nvSpPr>
+          <p:cNvPr id="2" name="Title 1"/>
+          <p:cNvSpPr>
+            <a:spLocks noGrp="1"/>
+          </p:cNvSpPr>
+          <p:nvPr>
+            <p:ph type="title"/>
+          </p:nvPr>
+        </p:nvSpPr>
+        <p:spPr/>
+        <p:txBody>
+          <a:bodyPr>
+            <a:normAutofit/>
+          </a:bodyPr>
+          <a:lstStyle/>
+          <a:p>
+            <a:r>
+              <a:rPr lang="en-US" dirty="0" smtClean="0">
+                <a:solidFill>
+                  <a:schemeClr val="bg1"/>
+                </a:solidFill>
+              </a:rPr>
+              <a:t>Petri Networks</a:t>
+            </a:r>
+            <a:endParaRPr lang="en-US" dirty="0">
+              <a:solidFill>
+                <a:schemeClr val="bg1"/>
+              </a:solidFill>
+            </a:endParaRPr>
+          </a:p>
+        </p:txBody>
+      </p:sp>
+      <p:sp>
+        <p:nvSpPr>
+          <p:cNvPr id="3" name="Content Placeholder 2"/>
+          <p:cNvSpPr>
+            <a:spLocks noGrp="1"/>
+          </p:cNvSpPr>
+          <p:nvPr>
+            <p:ph idx="1"/>
+          </p:nvPr>
+        </p:nvSpPr>
+        <p:spPr>
+          <a:xfrm>
+            <a:off x="1447800" y="1905000"/>
+            <a:ext cx="8229600" cy="4525963"/>
+          </a:xfrm>
+        </p:spPr>
+        <p:txBody>
+          <a:bodyPr/>
+          <a:lstStyle/>
+          <a:p>
+            <a:r>
+              <a:rPr lang="en-US" dirty="0" smtClean="0">
+                <a:solidFill>
+                  <a:srgbClr val="FFFFFF"/>
+                </a:solidFill>
+              </a:rPr>
+              <a:t>A directed graph</a:t>
+            </a:r>
+          </a:p>
+          <a:p>
+            <a:r>
+              <a:rPr lang="en-US" dirty="0" smtClean="0">
+                <a:solidFill>
+                  <a:srgbClr val="FFFFFF"/>
+                </a:solidFill>
+              </a:rPr>
+              <a:t>Consists of Places, Transitions, Arcs</a:t>
+            </a:r>
+          </a:p>
+          <a:p>
+            <a:pPr marL="0" indent="0">
+              <a:buNone/>
+            </a:pPr>
+            <a:endParaRPr lang="en-US" dirty="0">
+              <a:solidFill>
+                <a:srgbClr val="FFFFFF"/>
+              </a:solidFill>
+            </a:endParaRPr>
+          </a:p>
+        </p:txBody>
+      </p:sp>
+      <p:pic>
+        <p:nvPicPr>
+          <p:cNvPr id="4" name="Picture 3" descr="Petri_Net_A.jpg"/>
+          <p:cNvPicPr>
+            <a:picLocks noChangeAspect="1"/>
+          </p:cNvPicPr>
+          <p:nvPr/>
+        </p:nvPicPr>
+        <p:blipFill>
+          <a:blip r:embed="rId2">
+            <a:alphaModFix/>
+            <a:extLst>
+              <a:ext uri="{28A0092B-C50C-407E-A947-70E740481C1C}">
+                <a14:useLocalDpi xmlns:a14="http://schemas.microsoft.com/office/drawing/2010/main" val="0"/>
+              </a:ext>
+            </a:extLst>
+          </a:blip>
+          <a:stretch>
+            <a:fillRect/>
+          </a:stretch>
+        </p:blipFill>
+        <p:spPr>
+          <a:xfrm>
+            <a:off x="2209800" y="3581400"/>
+            <a:ext cx="4331293" cy="2122334"/>
+          </a:xfrm>
+          <a:prstGeom prst="rect">
+            <a:avLst/>
+          </a:prstGeom>
+          <a:ln>
+            <a:solidFill>
+              <a:srgbClr val="4F81BD"/>
+            </a:solidFill>
+          </a:ln>
+          <a:effectLst>
+            <a:reflection blurRad="6350" stA="52000" endA="300" endPos="35000" dir="5400000" sy="-100000" algn="bl" rotWithShape="0"/>
+          </a:effectLst>
+        </p:spPr>
+      </p:pic>
+      <p:sp>
+        <p:nvSpPr>
+          <p:cNvPr id="5" name="TextBox 4"/>
+          <p:cNvSpPr txBox="1"/>
+          <p:nvPr/>
+        </p:nvSpPr>
+        <p:spPr>
+          <a:xfrm>
+            <a:off x="5562600" y="6400800"/>
+            <a:ext cx="3429000" cy="276999"/>
+          </a:xfrm>
+          <a:prstGeom prst="rect">
+            <a:avLst/>
+          </a:prstGeom>
+          <a:noFill/>
+        </p:spPr>
+        <p:txBody>
+          <a:bodyPr wrap="square" rtlCol="0">
+            <a:spAutoFit/>
+          </a:bodyPr>
+          <a:lstStyle/>
+          <a:p>
+            <a:r>
+              <a:rPr lang="en-US" sz="1200" dirty="0">
+                <a:solidFill>
+                  <a:schemeClr val="bg1"/>
+                </a:solidFill>
+              </a:rPr>
+              <a:t>http://</a:t>
+            </a:r>
+            <a:r>
+              <a:rPr lang="en-US" sz="1200" dirty="0" err="1">
+                <a:solidFill>
+                  <a:schemeClr val="bg1"/>
+                </a:solidFill>
+              </a:rPr>
+              <a:t>en.wikipedia.org</a:t>
+            </a:r>
+            <a:r>
+              <a:rPr lang="en-US" sz="1200" dirty="0">
+                <a:solidFill>
+                  <a:schemeClr val="bg1"/>
+                </a:solidFill>
+              </a:rPr>
+              <a:t>/wiki/</a:t>
+            </a:r>
+            <a:r>
+              <a:rPr lang="en-US" sz="1200" dirty="0" err="1">
+                <a:solidFill>
+                  <a:schemeClr val="bg1"/>
+                </a:solidFill>
+              </a:rPr>
+              <a:t>File:Petri_Net_A.jpg</a:t>
+            </a:r>
+            <a:endParaRPr lang="en-US" sz="1200" dirty="0">
+              <a:solidFill>
+                <a:schemeClr val="bg1"/>
+              </a:solidFill>
+            </a:endParaRPr>
+          </a:p>
+        </p:txBody>
+      </p:sp>
+    </p:spTree>
+    <p:extLst>
+      <p:ext uri="{BB962C8B-B14F-4D97-AF65-F5344CB8AC3E}">
+        <p14:creationId xmlns:p14="http://schemas.microsoft.com/office/powerpoint/2010/main" val="1815241586"/>
+      </p:ext>
+    </p:extLst>
+  </p:cSld>
+  <p:clrMapOvr>
+    <a:masterClrMapping/>
+  </p:clrMapOvr>
+</p:sld>
+</file>
+
+<file path=ppt/slides/slide3.xml><?xml version="1.0" encoding="utf-8"?>
+<p:sld xmlns:a="http://schemas.openxmlformats.org/drawingml/2006/main" xmlns:r="http://schemas.openxmlformats.org/officeDocument/2006/relationships" xmlns:p="http://schemas.openxmlformats.org/presentationml/2006/main">
+  <p:cSld>
+    <p:spTree>
+      <p:nvGrpSpPr>
+        <p:cNvPr id="1" name=""/>
+        <p:cNvGrpSpPr/>
+        <p:nvPr/>
+      </p:nvGrpSpPr>
+      <p:grpSpPr>
+        <a:xfrm>
+          <a:off x="0" y="0"/>
+          <a:ext cx="0" cy="0"/>
+          <a:chOff x="0" y="0"/>
+          <a:chExt cx="0" cy="0"/>
+        </a:xfrm>
+      </p:grpSpPr>
+      <p:sp>
+        <p:nvSpPr>
+          <p:cNvPr id="2" name="Title 1"/>
+          <p:cNvSpPr>
+            <a:spLocks noGrp="1"/>
+          </p:cNvSpPr>
+          <p:nvPr>
+            <p:ph type="title"/>
+          </p:nvPr>
+        </p:nvSpPr>
+        <p:spPr/>
+        <p:txBody>
+          <a:bodyPr>
+            <a:normAutofit/>
+          </a:bodyPr>
+          <a:lstStyle/>
+          <a:p>
+            <a:r>
+              <a:rPr lang="en-US" dirty="0" smtClean="0">
+                <a:solidFill>
+                  <a:srgbClr val="FFFFFF"/>
+                </a:solidFill>
+              </a:rPr>
+              <a:t>Turning off the lights</a:t>
+            </a:r>
+            <a:endParaRPr lang="en-US" dirty="0">
+              <a:solidFill>
+                <a:srgbClr val="FFFFFF"/>
+              </a:solidFill>
+            </a:endParaRPr>
+          </a:p>
+        </p:txBody>
+      </p:sp>
+      <p:pic>
+        <p:nvPicPr>
+          <p:cNvPr id="4" name="Picture 3" descr="IMG_0743.jpg"/>
+          <p:cNvPicPr>
+            <a:picLocks noChangeAspect="1"/>
+          </p:cNvPicPr>
+          <p:nvPr/>
+        </p:nvPicPr>
+        <p:blipFill>
+          <a:blip r:embed="rId2">
+            <a:extLst>
+              <a:ext uri="{28A0092B-C50C-407E-A947-70E740481C1C}">
+                <a14:useLocalDpi xmlns:a14="http://schemas.microsoft.com/office/drawing/2010/main" val="0"/>
+              </a:ext>
+            </a:extLst>
+          </a:blip>
+          <a:stretch>
+            <a:fillRect/>
+          </a:stretch>
+        </p:blipFill>
+        <p:spPr>
+          <a:xfrm>
+            <a:off x="1371600" y="3200400"/>
+            <a:ext cx="1354873" cy="1600200"/>
+          </a:xfrm>
+          <a:prstGeom prst="rect">
+            <a:avLst/>
+          </a:prstGeom>
+        </p:spPr>
+      </p:pic>
+      <p:pic>
+        <p:nvPicPr>
+          <p:cNvPr id="5" name="Picture 4" descr="IMG_0744.jpg"/>
+          <p:cNvPicPr>
+            <a:picLocks noChangeAspect="1"/>
+          </p:cNvPicPr>
+          <p:nvPr/>
+        </p:nvPicPr>
+        <p:blipFill>
+          <a:blip r:embed="rId3">
+            <a:extLst>
+              <a:ext uri="{28A0092B-C50C-407E-A947-70E740481C1C}">
+                <a14:useLocalDpi xmlns:a14="http://schemas.microsoft.com/office/drawing/2010/main" val="0"/>
+              </a:ext>
+            </a:extLst>
+          </a:blip>
+          <a:stretch>
+            <a:fillRect/>
+          </a:stretch>
+        </p:blipFill>
+        <p:spPr>
+          <a:xfrm>
+            <a:off x="4038600" y="3200400"/>
+            <a:ext cx="1055077" cy="1600200"/>
+          </a:xfrm>
+          <a:prstGeom prst="rect">
+            <a:avLst/>
+          </a:prstGeom>
+        </p:spPr>
+      </p:pic>
+      <p:pic>
+        <p:nvPicPr>
+          <p:cNvPr id="6" name="Picture 5" descr="IMG_0747.jpg"/>
+          <p:cNvPicPr>
+            <a:picLocks noChangeAspect="1"/>
+          </p:cNvPicPr>
+          <p:nvPr/>
+        </p:nvPicPr>
+        <p:blipFill>
+          <a:blip r:embed="rId4">
+            <a:extLst>
+              <a:ext uri="{28A0092B-C50C-407E-A947-70E740481C1C}">
+                <a14:useLocalDpi xmlns:a14="http://schemas.microsoft.com/office/drawing/2010/main" val="0"/>
+              </a:ext>
+            </a:extLst>
+          </a:blip>
+          <a:stretch>
+            <a:fillRect/>
+          </a:stretch>
+        </p:blipFill>
+        <p:spPr>
+          <a:xfrm>
+            <a:off x="6781800" y="3200400"/>
+            <a:ext cx="982040" cy="1600200"/>
+          </a:xfrm>
+          <a:prstGeom prst="rect">
+            <a:avLst/>
+          </a:prstGeom>
+        </p:spPr>
+      </p:pic>
+      <p:sp>
+        <p:nvSpPr>
+          <p:cNvPr id="7" name="Oval 6"/>
+          <p:cNvSpPr/>
+          <p:nvPr/>
+        </p:nvSpPr>
+        <p:spPr>
+          <a:xfrm>
+            <a:off x="381000" y="1524000"/>
+            <a:ext cx="1219200" cy="1219200"/>
+          </a:xfrm>
+          <a:prstGeom prst="ellipse">
+            <a:avLst/>
+          </a:prstGeom>
+        </p:spPr>
+        <p:style>
+          <a:lnRef idx="1">
+            <a:schemeClr val="accent1"/>
+          </a:lnRef>
+          <a:fillRef idx="3">
+            <a:schemeClr val="accent1"/>
+          </a:fillRef>
+          <a:effectRef idx="2">
+            <a:schemeClr val="accent1"/>
+          </a:effectRef>
+          <a:fontRef idx="minor">
+            <a:schemeClr val="lt1"/>
+          </a:fontRef>
+        </p:style>
+        <p:txBody>
+          <a:bodyPr rtlCol="0" anchor="ctr"/>
+          <a:lstStyle/>
+          <a:p>
+            <a:pPr algn="ctr"/>
+            <a:r>
+              <a:rPr lang="en-US" dirty="0" smtClean="0"/>
+              <a:t>3 doors open</a:t>
+            </a:r>
+            <a:endParaRPr lang="en-US" dirty="0"/>
+          </a:p>
+        </p:txBody>
+      </p:sp>
+      <p:sp>
+        <p:nvSpPr>
+          <p:cNvPr id="8" name="Oval 7"/>
+          <p:cNvSpPr/>
+          <p:nvPr/>
+        </p:nvSpPr>
+        <p:spPr>
+          <a:xfrm>
+            <a:off x="2743200" y="1600200"/>
+            <a:ext cx="1219200" cy="1219200"/>
+          </a:xfrm>
+          <a:prstGeom prst="ellipse">
+            <a:avLst/>
+          </a:prstGeom>
+        </p:spPr>
+        <p:style>
+          <a:lnRef idx="1">
+            <a:schemeClr val="accent1"/>
+          </a:lnRef>
+          <a:fillRef idx="3">
+            <a:schemeClr val="accent1"/>
+          </a:fillRef>
+          <a:effectRef idx="2">
+            <a:schemeClr val="accent1"/>
+          </a:effectRef>
+          <a:fontRef idx="minor">
+            <a:schemeClr val="lt1"/>
+          </a:fontRef>
+        </p:style>
+        <p:txBody>
+          <a:bodyPr rtlCol="0" anchor="ctr"/>
+          <a:lstStyle/>
+          <a:p>
+            <a:pPr algn="ctr"/>
+            <a:r>
+              <a:rPr lang="en-US" dirty="0"/>
+              <a:t>2</a:t>
+            </a:r>
+            <a:r>
+              <a:rPr lang="en-US" dirty="0" smtClean="0"/>
+              <a:t> doors open</a:t>
+            </a:r>
+            <a:endParaRPr lang="en-US" dirty="0"/>
+          </a:p>
+        </p:txBody>
+      </p:sp>
+      <p:sp>
+        <p:nvSpPr>
+          <p:cNvPr id="9" name="Oval 8"/>
+          <p:cNvSpPr/>
+          <p:nvPr/>
+        </p:nvSpPr>
+        <p:spPr>
+          <a:xfrm>
+            <a:off x="5486400" y="1676400"/>
+            <a:ext cx="1219200" cy="1219200"/>
+          </a:xfrm>
+          <a:prstGeom prst="ellipse">
+            <a:avLst/>
+          </a:prstGeom>
+        </p:spPr>
+        <p:style>
+          <a:lnRef idx="1">
+            <a:schemeClr val="accent1"/>
+          </a:lnRef>
+          <a:fillRef idx="3">
+            <a:schemeClr val="accent1"/>
+          </a:fillRef>
+          <a:effectRef idx="2">
+            <a:schemeClr val="accent1"/>
+          </a:effectRef>
+          <a:fontRef idx="minor">
+            <a:schemeClr val="lt1"/>
+          </a:fontRef>
+        </p:style>
+        <p:txBody>
+          <a:bodyPr rtlCol="0" anchor="ctr"/>
+          <a:lstStyle/>
+          <a:p>
+            <a:pPr algn="ctr"/>
+            <a:r>
+              <a:rPr lang="en-US" dirty="0"/>
+              <a:t>1</a:t>
+            </a:r>
+            <a:r>
+              <a:rPr lang="en-US" dirty="0" smtClean="0"/>
+              <a:t> doors open</a:t>
+            </a:r>
+            <a:endParaRPr lang="en-US" dirty="0"/>
+          </a:p>
+        </p:txBody>
+      </p:sp>
+      <p:sp>
+        <p:nvSpPr>
+          <p:cNvPr id="10" name="Oval 9"/>
+          <p:cNvSpPr/>
+          <p:nvPr/>
+        </p:nvSpPr>
+        <p:spPr>
+          <a:xfrm>
+            <a:off x="7696200" y="1676400"/>
+            <a:ext cx="1219200" cy="1219200"/>
+          </a:xfrm>
+          <a:prstGeom prst="ellipse">
+            <a:avLst/>
+          </a:prstGeom>
+        </p:spPr>
+        <p:style>
+          <a:lnRef idx="1">
+            <a:schemeClr val="accent1"/>
+          </a:lnRef>
+          <a:fillRef idx="3">
+            <a:schemeClr val="accent1"/>
+          </a:fillRef>
+          <a:effectRef idx="2">
+            <a:schemeClr val="accent1"/>
+          </a:effectRef>
+          <a:fontRef idx="minor">
+            <a:schemeClr val="lt1"/>
+          </a:fontRef>
+        </p:style>
+        <p:txBody>
+          <a:bodyPr rtlCol="0" anchor="ctr"/>
+          <a:lstStyle/>
+          <a:p>
+            <a:pPr algn="ctr"/>
+            <a:r>
+              <a:rPr lang="en-US" dirty="0" smtClean="0"/>
+              <a:t>Lights Off</a:t>
+            </a:r>
+          </a:p>
+        </p:txBody>
+      </p:sp>
+      <p:cxnSp>
+        <p:nvCxnSpPr>
+          <p:cNvPr id="12" name="Straight Arrow Connector 11"/>
+          <p:cNvCxnSpPr>
+            <a:stCxn id="7" idx="5"/>
+          </p:cNvCxnSpPr>
+          <p:nvPr/>
+        </p:nvCxnSpPr>
+        <p:spPr>
+          <a:xfrm>
+            <a:off x="1421652" y="2564652"/>
+            <a:ext cx="178548" cy="635748"/>
+          </a:xfrm>
+          <a:prstGeom prst="straightConnector1">
+            <a:avLst/>
+          </a:prstGeom>
+          <a:ln>
+            <a:tailEnd type="arrow"/>
+          </a:ln>
+        </p:spPr>
+        <p:style>
+          <a:lnRef idx="2">
+            <a:schemeClr val="accent1"/>
+          </a:lnRef>
+          <a:fillRef idx="0">
+            <a:schemeClr val="accent1"/>
+          </a:fillRef>
+          <a:effectRef idx="1">
+            <a:schemeClr val="accent1"/>
+          </a:effectRef>
+          <a:fontRef idx="minor">
+            <a:schemeClr val="tx1"/>
+          </a:fontRef>
+        </p:style>
+      </p:cxnSp>
+      <p:cxnSp>
+        <p:nvCxnSpPr>
+          <p:cNvPr id="14" name="Straight Arrow Connector 13"/>
+          <p:cNvCxnSpPr>
+            <a:endCxn id="8" idx="3"/>
+          </p:cNvCxnSpPr>
+          <p:nvPr/>
+        </p:nvCxnSpPr>
+        <p:spPr>
+          <a:xfrm flipV="1">
+            <a:off x="2667000" y="2640852"/>
+            <a:ext cx="254748" cy="559548"/>
+          </a:xfrm>
+          <a:prstGeom prst="straightConnector1">
+            <a:avLst/>
+          </a:prstGeom>
+          <a:ln>
+            <a:tailEnd type="arrow"/>
+          </a:ln>
+        </p:spPr>
+        <p:style>
+          <a:lnRef idx="2">
+            <a:schemeClr val="accent1"/>
+          </a:lnRef>
+          <a:fillRef idx="0">
+            <a:schemeClr val="accent1"/>
+          </a:fillRef>
+          <a:effectRef idx="1">
+            <a:schemeClr val="accent1"/>
+          </a:effectRef>
+          <a:fontRef idx="minor">
+            <a:schemeClr val="tx1"/>
+          </a:fontRef>
+        </p:style>
+      </p:cxnSp>
+      <p:cxnSp>
+        <p:nvCxnSpPr>
+          <p:cNvPr id="19" name="Straight Arrow Connector 18"/>
+          <p:cNvCxnSpPr>
+            <a:stCxn id="8" idx="5"/>
+          </p:cNvCxnSpPr>
+          <p:nvPr/>
+        </p:nvCxnSpPr>
+        <p:spPr>
+          <a:xfrm>
+            <a:off x="3783852" y="2640852"/>
+            <a:ext cx="254748" cy="559548"/>
+          </a:xfrm>
+          <a:prstGeom prst="straightConnector1">
+            <a:avLst/>
+          </a:prstGeom>
+          <a:ln>
+            <a:tailEnd type="arrow"/>
+          </a:ln>
+        </p:spPr>
+        <p:style>
+          <a:lnRef idx="2">
+            <a:schemeClr val="accent1"/>
+          </a:lnRef>
+          <a:fillRef idx="0">
+            <a:schemeClr val="accent1"/>
+          </a:fillRef>
+          <a:effectRef idx="1">
+            <a:schemeClr val="accent1"/>
+          </a:effectRef>
+          <a:fontRef idx="minor">
+            <a:schemeClr val="tx1"/>
+          </a:fontRef>
+        </p:style>
+      </p:cxnSp>
+      <p:cxnSp>
+        <p:nvCxnSpPr>
+          <p:cNvPr id="20" name="Straight Arrow Connector 19"/>
+          <p:cNvCxnSpPr>
+            <a:stCxn id="9" idx="5"/>
+          </p:cNvCxnSpPr>
+          <p:nvPr/>
+        </p:nvCxnSpPr>
+        <p:spPr>
+          <a:xfrm>
+            <a:off x="6527052" y="2717052"/>
+            <a:ext cx="357096" cy="509496"/>
+          </a:xfrm>
+          <a:prstGeom prst="straightConnector1">
+            <a:avLst/>
+          </a:prstGeom>
+          <a:ln>
+            <a:tailEnd type="arrow"/>
+          </a:ln>
+        </p:spPr>
+        <p:style>
+          <a:lnRef idx="2">
+            <a:schemeClr val="accent1"/>
+          </a:lnRef>
+          <a:fillRef idx="0">
+            <a:schemeClr val="accent1"/>
+          </a:fillRef>
+          <a:effectRef idx="1">
+            <a:schemeClr val="accent1"/>
+          </a:effectRef>
+          <a:fontRef idx="minor">
+            <a:schemeClr val="tx1"/>
+          </a:fontRef>
+        </p:style>
+      </p:cxnSp>
+      <p:cxnSp>
+        <p:nvCxnSpPr>
+          <p:cNvPr id="22" name="Straight Arrow Connector 21"/>
+          <p:cNvCxnSpPr/>
+          <p:nvPr/>
+        </p:nvCxnSpPr>
+        <p:spPr>
+          <a:xfrm flipV="1">
+            <a:off x="5105400" y="2743200"/>
+            <a:ext cx="533400" cy="457200"/>
+          </a:xfrm>
+          <a:prstGeom prst="straightConnector1">
+            <a:avLst/>
+          </a:prstGeom>
+          <a:ln>
+            <a:tailEnd type="arrow"/>
+          </a:ln>
+        </p:spPr>
+        <p:style>
+          <a:lnRef idx="2">
+            <a:schemeClr val="accent1"/>
+          </a:lnRef>
+          <a:fillRef idx="0">
+            <a:schemeClr val="accent1"/>
+          </a:fillRef>
+          <a:effectRef idx="1">
+            <a:schemeClr val="accent1"/>
+          </a:effectRef>
+          <a:fontRef idx="minor">
+            <a:schemeClr val="tx1"/>
+          </a:fontRef>
+        </p:style>
+      </p:cxnSp>
+      <p:cxnSp>
+        <p:nvCxnSpPr>
+          <p:cNvPr id="23" name="Straight Arrow Connector 22"/>
+          <p:cNvCxnSpPr>
+            <a:endCxn id="10" idx="3"/>
+          </p:cNvCxnSpPr>
+          <p:nvPr/>
+        </p:nvCxnSpPr>
+        <p:spPr>
+          <a:xfrm flipV="1">
+            <a:off x="7696200" y="2717052"/>
+            <a:ext cx="178548" cy="483348"/>
+          </a:xfrm>
+          <a:prstGeom prst="straightConnector1">
+            <a:avLst/>
+          </a:prstGeom>
+          <a:ln>
+            <a:tailEnd type="arrow"/>
+          </a:ln>
+        </p:spPr>
+        <p:style>
+          <a:lnRef idx="2">
+            <a:schemeClr val="accent1"/>
+          </a:lnRef>
+          <a:fillRef idx="0">
+            <a:schemeClr val="accent1"/>
+          </a:fillRef>
+          <a:effectRef idx="1">
+            <a:schemeClr val="accent1"/>
+          </a:effectRef>
+          <a:fontRef idx="minor">
+            <a:schemeClr val="tx1"/>
+          </a:fontRef>
+        </p:style>
+      </p:cxnSp>
+      <p:sp>
+        <p:nvSpPr>
+          <p:cNvPr id="28" name="TextBox 27"/>
+          <p:cNvSpPr txBox="1"/>
+          <p:nvPr/>
+        </p:nvSpPr>
+        <p:spPr>
+          <a:xfrm>
+            <a:off x="1447800" y="4953000"/>
+            <a:ext cx="1295400" cy="369332"/>
+          </a:xfrm>
+          <a:prstGeom prst="rect">
+            <a:avLst/>
+          </a:prstGeom>
+          <a:noFill/>
+        </p:spPr>
+        <p:txBody>
+          <a:bodyPr wrap="square" rtlCol="0">
+            <a:spAutoFit/>
+          </a:bodyPr>
+          <a:lstStyle/>
+          <a:p>
+            <a:r>
+              <a:rPr lang="en-US" dirty="0" smtClean="0">
+                <a:solidFill>
+                  <a:srgbClr val="FFFFFF"/>
+                </a:solidFill>
+              </a:rPr>
+              <a:t>Close Door</a:t>
+            </a:r>
+            <a:endParaRPr lang="en-US" dirty="0">
+              <a:solidFill>
+                <a:srgbClr val="FFFFFF"/>
+              </a:solidFill>
+            </a:endParaRPr>
+          </a:p>
+        </p:txBody>
+      </p:sp>
+      <p:sp>
+        <p:nvSpPr>
+          <p:cNvPr id="30" name="TextBox 29"/>
+          <p:cNvSpPr txBox="1"/>
+          <p:nvPr/>
+        </p:nvSpPr>
+        <p:spPr>
+          <a:xfrm>
+            <a:off x="3962400" y="4953000"/>
+            <a:ext cx="1295400" cy="369332"/>
+          </a:xfrm>
+          <a:prstGeom prst="rect">
+            <a:avLst/>
+          </a:prstGeom>
+          <a:noFill/>
+        </p:spPr>
+        <p:txBody>
+          <a:bodyPr wrap="square" rtlCol="0">
+            <a:spAutoFit/>
+          </a:bodyPr>
+          <a:lstStyle/>
+          <a:p>
+            <a:r>
+              <a:rPr lang="en-US" dirty="0" smtClean="0">
+                <a:solidFill>
+                  <a:srgbClr val="FFFFFF"/>
+                </a:solidFill>
+              </a:rPr>
+              <a:t>Close Door</a:t>
+            </a:r>
+            <a:endParaRPr lang="en-US" dirty="0">
+              <a:solidFill>
+                <a:srgbClr val="FFFFFF"/>
+              </a:solidFill>
+            </a:endParaRPr>
+          </a:p>
+        </p:txBody>
+      </p:sp>
+      <p:sp>
+        <p:nvSpPr>
+          <p:cNvPr id="31" name="TextBox 30"/>
+          <p:cNvSpPr txBox="1"/>
+          <p:nvPr/>
+        </p:nvSpPr>
+        <p:spPr>
+          <a:xfrm>
+            <a:off x="6629400" y="4953000"/>
+            <a:ext cx="1295400" cy="369332"/>
+          </a:xfrm>
+          <a:prstGeom prst="rect">
+            <a:avLst/>
+          </a:prstGeom>
+          <a:noFill/>
+        </p:spPr>
+        <p:txBody>
+          <a:bodyPr wrap="square" rtlCol="0">
+            <a:spAutoFit/>
+          </a:bodyPr>
+          <a:lstStyle/>
+          <a:p>
+            <a:r>
+              <a:rPr lang="en-US" dirty="0" smtClean="0">
+                <a:solidFill>
+                  <a:srgbClr val="FFFFFF"/>
+                </a:solidFill>
+              </a:rPr>
+              <a:t>Close Door</a:t>
+            </a:r>
+            <a:endParaRPr lang="en-US" dirty="0">
+              <a:solidFill>
+                <a:srgbClr val="FFFFFF"/>
+              </a:solidFill>
+            </a:endParaRPr>
+          </a:p>
+        </p:txBody>
+      </p:sp>
+    </p:spTree>
+    <p:extLst>
+      <p:ext uri="{BB962C8B-B14F-4D97-AF65-F5344CB8AC3E}">
+        <p14:creationId xmlns:p14="http://schemas.microsoft.com/office/powerpoint/2010/main" val="557376562"/>
+      </p:ext>
+    </p:extLst>
+  </p:cSld>
+  <p:clrMapOvr>
+    <a:masterClrMapping/>
+  </p:clrMapOvr>
+</p:sld>
+</file>
+
+<file path=ppt/slides/slide4.xml><?xml version="1.0" encoding="utf-8"?>
+<p:sld xmlns:a="http://schemas.openxmlformats.org/drawingml/2006/main" xmlns:r="http://schemas.openxmlformats.org/officeDocument/2006/relationships" xmlns:p="http://schemas.openxmlformats.org/presentationml/2006/main">
+  <p:cSld>
+    <p:spTree>
+      <p:nvGrpSpPr>
+        <p:cNvPr id="1" name=""/>
+        <p:cNvGrpSpPr/>
+        <p:nvPr/>
+      </p:nvGrpSpPr>
+      <p:grpSpPr>
+        <a:xfrm>
+          <a:off x="0" y="0"/>
+          <a:ext cx="0" cy="0"/>
+          <a:chOff x="0" y="0"/>
+          <a:chExt cx="0" cy="0"/>
+        </a:xfrm>
+      </p:grpSpPr>
+      <p:sp>
+        <p:nvSpPr>
           <p:cNvPr id="3" name="Title 2"/>
           <p:cNvSpPr>
             <a:spLocks noGrp="1"/>
@@ -3389,14 +4264,14 @@
   <p:timing>
     <p:tnLst>
       <p:par>
-        <p:cTn id="1" dur="indefinite" restart="never" nodeType="tmRoot"/>
+        <p:cTn xmlns:p14="http://schemas.microsoft.com/office/powerpoint/2010/main" id="1" dur="indefinite" restart="never" nodeType="tmRoot"/>
       </p:par>
     </p:tnLst>
   </p:timing>
 </p:sld>
 </file>
 
-<file path=ppt/slides/slide3.xml><?xml version="1.0" encoding="utf-8"?>
+<file path=ppt/slides/slide5.xml><?xml version="1.0" encoding="utf-8"?>
 <p:sld xmlns:a="http://schemas.openxmlformats.org/drawingml/2006/main" xmlns:r="http://schemas.openxmlformats.org/officeDocument/2006/relationships" xmlns:p="http://schemas.openxmlformats.org/presentationml/2006/main">
   <p:cSld>
     <p:spTree>
@@ -3688,14 +4563,14 @@
   <p:timing>
     <p:tnLst>
       <p:par>
-        <p:cTn id="1" dur="indefinite" restart="never" nodeType="tmRoot"/>
+        <p:cTn xmlns:p14="http://schemas.microsoft.com/office/powerpoint/2010/main" id="1" dur="indefinite" restart="never" nodeType="tmRoot"/>
       </p:par>
     </p:tnLst>
   </p:timing>
 </p:sld>
 </file>
 
-<file path=ppt/slides/slide4.xml><?xml version="1.0" encoding="utf-8"?>
+<file path=ppt/slides/slide6.xml><?xml version="1.0" encoding="utf-8"?>
 <p:sld xmlns:a="http://schemas.openxmlformats.org/drawingml/2006/main" xmlns:r="http://schemas.openxmlformats.org/officeDocument/2006/relationships" xmlns:p="http://schemas.openxmlformats.org/presentationml/2006/main">
   <p:cSld>
     <p:spTree>
@@ -3865,14 +4740,209 @@
   <p:timing>
     <p:tnLst>
       <p:par>
-        <p:cTn id="1" dur="indefinite" restart="never" nodeType="tmRoot"/>
+        <p:cTn xmlns:p14="http://schemas.microsoft.com/office/powerpoint/2010/main" id="1" dur="indefinite" restart="never" nodeType="tmRoot"/>
       </p:par>
     </p:tnLst>
   </p:timing>
 </p:sld>
 </file>
 
-<file path=ppt/slides/slide5.xml><?xml version="1.0" encoding="utf-8"?>
+<file path=ppt/slides/slide7.xml><?xml version="1.0" encoding="utf-8"?>
+<p:sld xmlns:a="http://schemas.openxmlformats.org/drawingml/2006/main" xmlns:r="http://schemas.openxmlformats.org/officeDocument/2006/relationships" xmlns:p="http://schemas.openxmlformats.org/presentationml/2006/main">
+  <p:cSld>
+    <p:spTree>
+      <p:nvGrpSpPr>
+        <p:cNvPr id="1" name=""/>
+        <p:cNvGrpSpPr/>
+        <p:nvPr/>
+      </p:nvGrpSpPr>
+      <p:grpSpPr>
+        <a:xfrm>
+          <a:off x="0" y="0"/>
+          <a:ext cx="0" cy="0"/>
+          <a:chOff x="0" y="0"/>
+          <a:chExt cx="0" cy="0"/>
+        </a:xfrm>
+      </p:grpSpPr>
+      <p:sp>
+        <p:nvSpPr>
+          <p:cNvPr id="3" name="Title 2"/>
+          <p:cNvSpPr>
+            <a:spLocks noGrp="1"/>
+          </p:cNvSpPr>
+          <p:nvPr>
+            <p:ph type="title"/>
+          </p:nvPr>
+        </p:nvSpPr>
+        <p:spPr/>
+        <p:txBody>
+          <a:bodyPr/>
+          <a:lstStyle/>
+          <a:p>
+            <a:r>
+              <a:rPr lang="en-US" dirty="0" smtClean="0">
+                <a:solidFill>
+                  <a:schemeClr val="bg1"/>
+                </a:solidFill>
+              </a:rPr>
+              <a:t>Results</a:t>
+            </a:r>
+            <a:endParaRPr lang="en-US" dirty="0">
+              <a:solidFill>
+                <a:schemeClr val="bg1"/>
+              </a:solidFill>
+            </a:endParaRPr>
+          </a:p>
+        </p:txBody>
+      </p:sp>
+      <p:sp>
+        <p:nvSpPr>
+          <p:cNvPr id="2" name="Content Placeholder 1"/>
+          <p:cNvSpPr>
+            <a:spLocks noGrp="1"/>
+          </p:cNvSpPr>
+          <p:nvPr>
+            <p:ph idx="1"/>
+          </p:nvPr>
+        </p:nvSpPr>
+        <p:spPr>
+          <a:xfrm>
+            <a:off x="2743200" y="3124200"/>
+            <a:ext cx="3657600" cy="3001963"/>
+          </a:xfrm>
+        </p:spPr>
+        <p:txBody>
+          <a:bodyPr/>
+          <a:lstStyle/>
+          <a:p>
+            <a:pPr marL="0" indent="0">
+              <a:buNone/>
+            </a:pPr>
+            <a:endParaRPr lang="en-US" dirty="0">
+              <a:solidFill>
+                <a:schemeClr val="bg1"/>
+              </a:solidFill>
+            </a:endParaRPr>
+          </a:p>
+        </p:txBody>
+      </p:sp>
+      <p:pic>
+        <p:nvPicPr>
+          <p:cNvPr id="4" name="Picture 3"/>
+          <p:cNvPicPr>
+            <a:picLocks noChangeAspect="1"/>
+          </p:cNvPicPr>
+          <p:nvPr/>
+        </p:nvPicPr>
+        <p:blipFill>
+          <a:blip r:embed="rId2">
+            <a:extLst>
+              <a:ext uri="{28A0092B-C50C-407E-A947-70E740481C1C}">
+                <a14:useLocalDpi xmlns:a14="http://schemas.microsoft.com/office/drawing/2010/main" val="0"/>
+              </a:ext>
+            </a:extLst>
+          </a:blip>
+          <a:stretch>
+            <a:fillRect/>
+          </a:stretch>
+        </p:blipFill>
+        <p:spPr>
+          <a:xfrm>
+            <a:off x="1143000" y="1371600"/>
+            <a:ext cx="6858000" cy="5244353"/>
+          </a:xfrm>
+          <a:prstGeom prst="rect">
+            <a:avLst/>
+          </a:prstGeom>
+        </p:spPr>
+      </p:pic>
+    </p:spTree>
+    <p:extLst>
+      <p:ext uri="{BB962C8B-B14F-4D97-AF65-F5344CB8AC3E}">
+        <p14:creationId xmlns:p14="http://schemas.microsoft.com/office/powerpoint/2010/main" val="1981994058"/>
+      </p:ext>
+    </p:extLst>
+  </p:cSld>
+  <p:clrMapOvr>
+    <a:masterClrMapping/>
+  </p:clrMapOvr>
+  <p:timing>
+    <p:tnLst>
+      <p:par>
+        <p:cTn xmlns:p14="http://schemas.microsoft.com/office/powerpoint/2010/main" id="1" dur="indefinite" restart="never" nodeType="tmRoot"/>
+      </p:par>
+    </p:tnLst>
+  </p:timing>
+</p:sld>
+</file>
+
+<file path=ppt/slides/slide8.xml><?xml version="1.0" encoding="utf-8"?>
+<p:sld xmlns:a="http://schemas.openxmlformats.org/drawingml/2006/main" xmlns:r="http://schemas.openxmlformats.org/officeDocument/2006/relationships" xmlns:p="http://schemas.openxmlformats.org/presentationml/2006/main">
+  <p:cSld>
+    <p:spTree>
+      <p:nvGrpSpPr>
+        <p:cNvPr id="1" name=""/>
+        <p:cNvGrpSpPr/>
+        <p:nvPr/>
+      </p:nvGrpSpPr>
+      <p:grpSpPr>
+        <a:xfrm>
+          <a:off x="0" y="0"/>
+          <a:ext cx="0" cy="0"/>
+          <a:chOff x="0" y="0"/>
+          <a:chExt cx="0" cy="0"/>
+        </a:xfrm>
+      </p:grpSpPr>
+      <p:sp>
+        <p:nvSpPr>
+          <p:cNvPr id="2" name="Title 1"/>
+          <p:cNvSpPr>
+            <a:spLocks noGrp="1"/>
+          </p:cNvSpPr>
+          <p:nvPr>
+            <p:ph type="title"/>
+          </p:nvPr>
+        </p:nvSpPr>
+        <p:spPr>
+          <a:xfrm>
+            <a:off x="457200" y="2514600"/>
+            <a:ext cx="8229600" cy="1143000"/>
+          </a:xfrm>
+        </p:spPr>
+        <p:txBody>
+          <a:bodyPr/>
+          <a:lstStyle/>
+          <a:p>
+            <a:r>
+              <a:rPr lang="en-US" dirty="0" smtClean="0">
+                <a:solidFill>
+                  <a:srgbClr val="FFFFFF"/>
+                </a:solidFill>
+              </a:rPr>
+              <a:t>Demo</a:t>
+            </a:r>
+            <a:endParaRPr lang="en-US" dirty="0">
+              <a:solidFill>
+                <a:srgbClr val="FFFFFF"/>
+              </a:solidFill>
+            </a:endParaRPr>
+          </a:p>
+        </p:txBody>
+      </p:sp>
+    </p:spTree>
+    <p:extLst>
+      <p:ext uri="{BB962C8B-B14F-4D97-AF65-F5344CB8AC3E}">
+        <p14:creationId xmlns:p14="http://schemas.microsoft.com/office/powerpoint/2010/main" val="3566543987"/>
+      </p:ext>
+    </p:extLst>
+  </p:cSld>
+  <p:clrMapOvr>
+    <a:masterClrMapping/>
+  </p:clrMapOvr>
+</p:sld>
+</file>
+
+<file path=ppt/slides/slide9.xml><?xml version="1.0" encoding="utf-8"?>
 <p:sld xmlns:a="http://schemas.openxmlformats.org/drawingml/2006/main" xmlns:r="http://schemas.openxmlformats.org/officeDocument/2006/relationships" xmlns:p="http://schemas.openxmlformats.org/presentationml/2006/main">
   <p:cSld>
     <p:spTree>
@@ -3950,136 +5020,7 @@
   <p:timing>
     <p:tnLst>
       <p:par>
-        <p:cTn id="1" dur="indefinite" restart="never" nodeType="tmRoot"/>
-      </p:par>
-    </p:tnLst>
-  </p:timing>
-</p:sld>
-</file>
-
-<file path=ppt/slides/slide6.xml><?xml version="1.0" encoding="utf-8"?>
-<p:sld xmlns:a="http://schemas.openxmlformats.org/drawingml/2006/main" xmlns:r="http://schemas.openxmlformats.org/officeDocument/2006/relationships" xmlns:p="http://schemas.openxmlformats.org/presentationml/2006/main">
-  <p:cSld>
-    <p:spTree>
-      <p:nvGrpSpPr>
-        <p:cNvPr id="1" name=""/>
-        <p:cNvGrpSpPr/>
-        <p:nvPr/>
-      </p:nvGrpSpPr>
-      <p:grpSpPr>
-        <a:xfrm>
-          <a:off x="0" y="0"/>
-          <a:ext cx="0" cy="0"/>
-          <a:chOff x="0" y="0"/>
-          <a:chExt cx="0" cy="0"/>
-        </a:xfrm>
-      </p:grpSpPr>
-      <p:sp>
-        <p:nvSpPr>
-          <p:cNvPr id="3" name="Title 2"/>
-          <p:cNvSpPr>
-            <a:spLocks noGrp="1"/>
-          </p:cNvSpPr>
-          <p:nvPr>
-            <p:ph type="title"/>
-          </p:nvPr>
-        </p:nvSpPr>
-        <p:spPr/>
-        <p:txBody>
-          <a:bodyPr/>
-          <a:lstStyle/>
-          <a:p>
-            <a:r>
-              <a:rPr lang="en-US" dirty="0" smtClean="0">
-                <a:solidFill>
-                  <a:schemeClr val="bg1"/>
-                </a:solidFill>
-              </a:rPr>
-              <a:t>Results</a:t>
-            </a:r>
-            <a:endParaRPr lang="en-US" dirty="0">
-              <a:solidFill>
-                <a:schemeClr val="bg1"/>
-              </a:solidFill>
-            </a:endParaRPr>
-          </a:p>
-        </p:txBody>
-      </p:sp>
-      <p:sp>
-        <p:nvSpPr>
-          <p:cNvPr id="2" name="Content Placeholder 1"/>
-          <p:cNvSpPr>
-            <a:spLocks noGrp="1"/>
-          </p:cNvSpPr>
-          <p:nvPr>
-            <p:ph idx="1"/>
-          </p:nvPr>
-        </p:nvSpPr>
-        <p:spPr>
-          <a:xfrm>
-            <a:off x="2743200" y="3124200"/>
-            <a:ext cx="3657600" cy="3001963"/>
-          </a:xfrm>
-        </p:spPr>
-        <p:txBody>
-          <a:bodyPr/>
-          <a:lstStyle/>
-          <a:p>
-            <a:pPr marL="0" indent="0">
-              <a:buNone/>
-            </a:pPr>
-            <a:endParaRPr lang="en-US" dirty="0">
-              <a:solidFill>
-                <a:schemeClr val="bg1"/>
-              </a:solidFill>
-            </a:endParaRPr>
-          </a:p>
-        </p:txBody>
-      </p:sp>
-      <p:pic>
-        <p:nvPicPr>
-          <p:cNvPr id="4" name="Picture 3"/>
-          <p:cNvPicPr>
-            <a:picLocks noChangeAspect="1"/>
-          </p:cNvPicPr>
-          <p:nvPr/>
-        </p:nvPicPr>
-        <p:blipFill>
-          <a:blip r:embed="rId2">
-            <a:extLst>
-              <a:ext uri="{28A0092B-C50C-407E-A947-70E740481C1C}">
-                <a14:useLocalDpi xmlns:a14="http://schemas.microsoft.com/office/drawing/2010/main" val="0"/>
-              </a:ext>
-            </a:extLst>
-          </a:blip>
-          <a:stretch>
-            <a:fillRect/>
-          </a:stretch>
-        </p:blipFill>
-        <p:spPr>
-          <a:xfrm>
-            <a:off x="1143000" y="1440872"/>
-            <a:ext cx="6858000" cy="5244353"/>
-          </a:xfrm>
-          <a:prstGeom prst="rect">
-            <a:avLst/>
-          </a:prstGeom>
-        </p:spPr>
-      </p:pic>
-    </p:spTree>
-    <p:extLst>
-      <p:ext uri="{BB962C8B-B14F-4D97-AF65-F5344CB8AC3E}">
-        <p14:creationId xmlns:p14="http://schemas.microsoft.com/office/powerpoint/2010/main" val="1981994058"/>
-      </p:ext>
-    </p:extLst>
-  </p:cSld>
-  <p:clrMapOvr>
-    <a:masterClrMapping/>
-  </p:clrMapOvr>
-  <p:timing>
-    <p:tnLst>
-      <p:par>
-        <p:cTn id="1" dur="indefinite" restart="never" nodeType="tmRoot"/>
+        <p:cTn xmlns:p14="http://schemas.microsoft.com/office/powerpoint/2010/main" id="1" dur="indefinite" restart="never" nodeType="tmRoot"/>
       </p:par>
     </p:tnLst>
   </p:timing>

</xml_diff>

<commit_message>
Added links to the repo to both documents
</commit_message>
<xml_diff>
--- a/JPeNS_Presentation.pptx
+++ b/JPeNS_Presentation.pptx
@@ -3218,6 +3218,63 @@
                 <a:schemeClr val="bg1"/>
               </a:solidFill>
             </a:endParaRPr>
+          </a:p>
+        </p:txBody>
+      </p:sp>
+      <p:sp>
+        <p:nvSpPr>
+          <p:cNvPr id="4" name="TextBox 3"/>
+          <p:cNvSpPr txBox="1"/>
+          <p:nvPr/>
+        </p:nvSpPr>
+        <p:spPr>
+          <a:xfrm>
+            <a:off x="2895600" y="5867400"/>
+            <a:ext cx="3352800" cy="369332"/>
+          </a:xfrm>
+          <a:prstGeom prst="rect">
+            <a:avLst/>
+          </a:prstGeom>
+          <a:noFill/>
+        </p:spPr>
+        <p:txBody>
+          <a:bodyPr wrap="square" rtlCol="0">
+            <a:spAutoFit/>
+          </a:bodyPr>
+          <a:lstStyle/>
+          <a:p>
+            <a:r>
+              <a:rPr lang="en-US" dirty="0">
+                <a:solidFill>
+                  <a:schemeClr val="bg1"/>
+                </a:solidFill>
+              </a:rPr>
+              <a:t>https://</a:t>
+            </a:r>
+            <a:r>
+              <a:rPr lang="en-US" dirty="0" err="1">
+                <a:solidFill>
+                  <a:schemeClr val="bg1"/>
+                </a:solidFill>
+              </a:rPr>
+              <a:t>github.com</a:t>
+            </a:r>
+            <a:r>
+              <a:rPr lang="en-US" dirty="0">
+                <a:solidFill>
+                  <a:schemeClr val="bg1"/>
+                </a:solidFill>
+              </a:rPr>
+              <a:t>/Hobbit/JPeNS</a:t>
+            </a:r>
+            <a:r>
+              <a:rPr lang="en-US" dirty="0">
+                <a:solidFill>
+                  <a:schemeClr val="bg1"/>
+                </a:solidFill>
+              </a:rPr>
+              <a:t> </a:t>
+            </a:r>
           </a:p>
         </p:txBody>
       </p:sp>

</xml_diff>